<commit_message>
Changed background info slides
</commit_message>
<xml_diff>
--- a/Project 1/Project-1.pptx
+++ b/Project 1/Project-1.pptx
@@ -8,21 +8,22 @@
     <p:sldId id="256" r:id="rId2"/>
     <p:sldId id="261" r:id="rId3"/>
     <p:sldId id="262" r:id="rId4"/>
-    <p:sldId id="259" r:id="rId5"/>
-    <p:sldId id="264" r:id="rId6"/>
-    <p:sldId id="265" r:id="rId7"/>
-    <p:sldId id="276" r:id="rId8"/>
-    <p:sldId id="258" r:id="rId9"/>
-    <p:sldId id="266" r:id="rId10"/>
-    <p:sldId id="271" r:id="rId11"/>
-    <p:sldId id="269" r:id="rId12"/>
-    <p:sldId id="270" r:id="rId13"/>
-    <p:sldId id="273" r:id="rId14"/>
-    <p:sldId id="268" r:id="rId15"/>
-    <p:sldId id="272" r:id="rId16"/>
-    <p:sldId id="274" r:id="rId17"/>
-    <p:sldId id="275" r:id="rId18"/>
-    <p:sldId id="263" r:id="rId19"/>
+    <p:sldId id="277" r:id="rId5"/>
+    <p:sldId id="259" r:id="rId6"/>
+    <p:sldId id="264" r:id="rId7"/>
+    <p:sldId id="265" r:id="rId8"/>
+    <p:sldId id="276" r:id="rId9"/>
+    <p:sldId id="258" r:id="rId10"/>
+    <p:sldId id="266" r:id="rId11"/>
+    <p:sldId id="271" r:id="rId12"/>
+    <p:sldId id="269" r:id="rId13"/>
+    <p:sldId id="270" r:id="rId14"/>
+    <p:sldId id="273" r:id="rId15"/>
+    <p:sldId id="268" r:id="rId16"/>
+    <p:sldId id="272" r:id="rId17"/>
+    <p:sldId id="274" r:id="rId18"/>
+    <p:sldId id="275" r:id="rId19"/>
+    <p:sldId id="263" r:id="rId20"/>
   </p:sldIdLst>
   <p:sldSz cx="12192000" cy="6858000"/>
   <p:notesSz cx="6858000" cy="9144000"/>
@@ -224,7 +225,7 @@
           <a:effectLst/>
           <a:extLst>
             <a:ext uri="{91240B29-F687-4f45-9708-019B960494DF}">
-              <a14:hiddenLine xmlns:a14="http://schemas.microsoft.com/office/drawing/2010/main" xmlns="" w="9525">
+              <a14:hiddenLine xmlns="" xmlns:a14="http://schemas.microsoft.com/office/drawing/2010/main" w="9525">
                 <a:solidFill>
                   <a:srgbClr val="000000"/>
                 </a:solidFill>
@@ -416,7 +417,7 @@
           <a:p>
             <a:fld id="{F1FD765F-AC2D-42AA-A0E5-12A28983CCAB}" type="datetimeFigureOut">
               <a:rPr lang="en-US" smtClean="0"/>
-              <a:t>4/6/2019</a:t>
+              <a:t>4/7/2019</a:t>
             </a:fld>
             <a:endParaRPr lang="en-US"/>
           </a:p>
@@ -739,7 +740,7 @@
           <a:p>
             <a:fld id="{F1FD765F-AC2D-42AA-A0E5-12A28983CCAB}" type="datetimeFigureOut">
               <a:rPr lang="en-US" smtClean="0"/>
-              <a:t>4/6/2019</a:t>
+              <a:t>4/7/2019</a:t>
             </a:fld>
             <a:endParaRPr lang="en-US"/>
           </a:p>
@@ -1227,7 +1228,7 @@
           <a:p>
             <a:fld id="{F1FD765F-AC2D-42AA-A0E5-12A28983CCAB}" type="datetimeFigureOut">
               <a:rPr lang="en-US" smtClean="0"/>
-              <a:t>4/6/2019</a:t>
+              <a:t>4/7/2019</a:t>
             </a:fld>
             <a:endParaRPr lang="en-US"/>
           </a:p>
@@ -1596,7 +1597,7 @@
           <a:p>
             <a:fld id="{F1FD765F-AC2D-42AA-A0E5-12A28983CCAB}" type="datetimeFigureOut">
               <a:rPr lang="en-US" smtClean="0"/>
-              <a:t>4/6/2019</a:t>
+              <a:t>4/7/2019</a:t>
             </a:fld>
             <a:endParaRPr lang="en-US"/>
           </a:p>
@@ -1751,7 +1752,7 @@
           <a:ln/>
           <a:extLst>
             <a:ext uri="{91240B29-F687-4f45-9708-019B960494DF}">
-              <a14:hiddenLine xmlns:a14="http://schemas.microsoft.com/office/drawing/2010/main" xmlns="" w="9525">
+              <a14:hiddenLine xmlns="" xmlns:a14="http://schemas.microsoft.com/office/drawing/2010/main" w="9525">
                 <a:solidFill>
                   <a:srgbClr val="000000"/>
                 </a:solidFill>
@@ -1869,7 +1870,7 @@
           <a:p>
             <a:fld id="{F1FD765F-AC2D-42AA-A0E5-12A28983CCAB}" type="datetimeFigureOut">
               <a:rPr lang="en-US" smtClean="0"/>
-              <a:t>4/6/2019</a:t>
+              <a:t>4/7/2019</a:t>
             </a:fld>
             <a:endParaRPr lang="en-US"/>
           </a:p>
@@ -2026,7 +2027,7 @@
           <a:ln/>
           <a:extLst>
             <a:ext uri="{91240B29-F687-4f45-9708-019B960494DF}">
-              <a14:hiddenLine xmlns:a14="http://schemas.microsoft.com/office/drawing/2010/main" xmlns="" w="9525">
+              <a14:hiddenLine xmlns="" xmlns:a14="http://schemas.microsoft.com/office/drawing/2010/main" w="9525">
                 <a:solidFill>
                   <a:srgbClr val="000000"/>
                 </a:solidFill>
@@ -2154,7 +2155,7 @@
           <a:p>
             <a:fld id="{F1FD765F-AC2D-42AA-A0E5-12A28983CCAB}" type="datetimeFigureOut">
               <a:rPr lang="en-US" smtClean="0"/>
-              <a:t>4/6/2019</a:t>
+              <a:t>4/7/2019</a:t>
             </a:fld>
             <a:endParaRPr lang="en-US"/>
           </a:p>
@@ -2314,7 +2315,7 @@
           <a:ln/>
           <a:extLst>
             <a:ext uri="{91240B29-F687-4f45-9708-019B960494DF}">
-              <a14:hiddenLine xmlns:a14="http://schemas.microsoft.com/office/drawing/2010/main" xmlns="" w="9525">
+              <a14:hiddenLine xmlns="" xmlns:a14="http://schemas.microsoft.com/office/drawing/2010/main" w="9525">
                 <a:solidFill>
                   <a:srgbClr val="000000"/>
                 </a:solidFill>
@@ -2442,7 +2443,7 @@
           <a:p>
             <a:fld id="{F1FD765F-AC2D-42AA-A0E5-12A28983CCAB}" type="datetimeFigureOut">
               <a:rPr lang="en-US" smtClean="0"/>
-              <a:t>4/6/2019</a:t>
+              <a:t>4/7/2019</a:t>
             </a:fld>
             <a:endParaRPr lang="en-US"/>
           </a:p>
@@ -2785,7 +2786,7 @@
           <a:p>
             <a:fld id="{F1FD765F-AC2D-42AA-A0E5-12A28983CCAB}" type="datetimeFigureOut">
               <a:rPr lang="en-US" smtClean="0"/>
-              <a:t>4/6/2019</a:t>
+              <a:t>4/7/2019</a:t>
             </a:fld>
             <a:endParaRPr lang="en-US"/>
           </a:p>
@@ -2945,7 +2946,7 @@
           <a:ln/>
           <a:extLst>
             <a:ext uri="{91240B29-F687-4f45-9708-019B960494DF}">
-              <a14:hiddenLine xmlns:a14="http://schemas.microsoft.com/office/drawing/2010/main" xmlns="" w="9525">
+              <a14:hiddenLine xmlns="" xmlns:a14="http://schemas.microsoft.com/office/drawing/2010/main" w="9525">
                 <a:solidFill>
                   <a:srgbClr val="000000"/>
                 </a:solidFill>
@@ -3129,7 +3130,7 @@
           <a:p>
             <a:fld id="{F1FD765F-AC2D-42AA-A0E5-12A28983CCAB}" type="datetimeFigureOut">
               <a:rPr lang="en-US" smtClean="0"/>
-              <a:t>4/6/2019</a:t>
+              <a:t>4/7/2019</a:t>
             </a:fld>
             <a:endParaRPr lang="en-US"/>
           </a:p>
@@ -3284,7 +3285,7 @@
           <a:ln/>
           <a:extLst>
             <a:ext uri="{91240B29-F687-4f45-9708-019B960494DF}">
-              <a14:hiddenLine xmlns:a14="http://schemas.microsoft.com/office/drawing/2010/main" xmlns="" w="9525">
+              <a14:hiddenLine xmlns="" xmlns:a14="http://schemas.microsoft.com/office/drawing/2010/main" w="9525">
                 <a:solidFill>
                   <a:srgbClr val="000000"/>
                 </a:solidFill>
@@ -3606,7 +3607,7 @@
           <a:p>
             <a:fld id="{F1FD765F-AC2D-42AA-A0E5-12A28983CCAB}" type="datetimeFigureOut">
               <a:rPr lang="en-US" smtClean="0"/>
-              <a:t>4/6/2019</a:t>
+              <a:t>4/7/2019</a:t>
             </a:fld>
             <a:endParaRPr lang="en-US"/>
           </a:p>
@@ -3761,7 +3762,7 @@
           <a:ln/>
           <a:extLst>
             <a:ext uri="{91240B29-F687-4f45-9708-019B960494DF}">
-              <a14:hiddenLine xmlns:a14="http://schemas.microsoft.com/office/drawing/2010/main" xmlns="" w="9525">
+              <a14:hiddenLine xmlns="" xmlns:a14="http://schemas.microsoft.com/office/drawing/2010/main" w="9525">
                 <a:solidFill>
                   <a:srgbClr val="000000"/>
                 </a:solidFill>
@@ -3827,7 +3828,7 @@
           <a:p>
             <a:fld id="{F1FD765F-AC2D-42AA-A0E5-12A28983CCAB}" type="datetimeFigureOut">
               <a:rPr lang="en-US" smtClean="0"/>
-              <a:t>4/6/2019</a:t>
+              <a:t>4/7/2019</a:t>
             </a:fld>
             <a:endParaRPr lang="en-US"/>
           </a:p>
@@ -3922,7 +3923,7 @@
           <a:p>
             <a:fld id="{F1FD765F-AC2D-42AA-A0E5-12A28983CCAB}" type="datetimeFigureOut">
               <a:rPr lang="en-US" smtClean="0"/>
-              <a:t>4/6/2019</a:t>
+              <a:t>4/7/2019</a:t>
             </a:fld>
             <a:endParaRPr lang="en-US"/>
           </a:p>
@@ -4190,7 +4191,7 @@
           <a:ln/>
           <a:extLst>
             <a:ext uri="{91240B29-F687-4f45-9708-019B960494DF}">
-              <a14:hiddenLine xmlns:a14="http://schemas.microsoft.com/office/drawing/2010/main" xmlns="" w="9525">
+              <a14:hiddenLine xmlns="" xmlns:a14="http://schemas.microsoft.com/office/drawing/2010/main" w="9525">
                 <a:solidFill>
                   <a:srgbClr val="000000"/>
                 </a:solidFill>
@@ -4389,7 +4390,7 @@
           <a:p>
             <a:fld id="{F1FD765F-AC2D-42AA-A0E5-12A28983CCAB}" type="datetimeFigureOut">
               <a:rPr lang="en-US" smtClean="0"/>
-              <a:t>4/6/2019</a:t>
+              <a:t>4/7/2019</a:t>
             </a:fld>
             <a:endParaRPr lang="en-US"/>
           </a:p>
@@ -4702,7 +4703,7 @@
           <a:p>
             <a:fld id="{F1FD765F-AC2D-42AA-A0E5-12A28983CCAB}" type="datetimeFigureOut">
               <a:rPr lang="en-US" smtClean="0"/>
-              <a:t>4/6/2019</a:t>
+              <a:t>4/7/2019</a:t>
             </a:fld>
             <a:endParaRPr lang="en-US"/>
           </a:p>
@@ -4972,7 +4973,7 @@
           <a:p>
             <a:fld id="{F1FD765F-AC2D-42AA-A0E5-12A28983CCAB}" type="datetimeFigureOut">
               <a:rPr lang="en-US" smtClean="0"/>
-              <a:t>4/6/2019</a:t>
+              <a:t>4/7/2019</a:t>
             </a:fld>
             <a:endParaRPr lang="en-US"/>
           </a:p>
@@ -5602,6 +5603,373 @@
     <p:bg>
       <p:bgPr>
         <a:solidFill>
+          <a:schemeClr val="bg2"/>
+        </a:solidFill>
+        <a:effectLst/>
+      </p:bgPr>
+    </p:bg>
+    <p:spTree>
+      <p:nvGrpSpPr>
+        <p:cNvPr id="1" name=""/>
+        <p:cNvGrpSpPr/>
+        <p:nvPr/>
+      </p:nvGrpSpPr>
+      <p:grpSpPr>
+        <a:xfrm>
+          <a:off x="0" y="0"/>
+          <a:ext cx="0" cy="0"/>
+          <a:chOff x="0" y="0"/>
+          <a:chExt cx="0" cy="0"/>
+        </a:xfrm>
+      </p:grpSpPr>
+      <p:pic>
+        <p:nvPicPr>
+          <p:cNvPr id="4" name="Picture 3">
+            <a:extLst>
+              <a:ext uri="{FF2B5EF4-FFF2-40B4-BE49-F238E27FC236}">
+                <a16:creationId xmlns:a16="http://schemas.microsoft.com/office/drawing/2014/main" id="{189EB6E8-5713-46B3-9518-2323FFBFEDFB}"/>
+              </a:ext>
+            </a:extLst>
+          </p:cNvPr>
+          <p:cNvPicPr>
+            <a:picLocks noChangeAspect="1"/>
+          </p:cNvPicPr>
+          <p:nvPr/>
+        </p:nvPicPr>
+        <p:blipFill rotWithShape="1">
+          <a:blip r:embed="rId2">
+            <a:extLst/>
+          </a:blip>
+          <a:srcRect t="15262" r="9091" b="15401"/>
+          <a:stretch/>
+        </p:blipFill>
+        <p:spPr>
+          <a:xfrm>
+            <a:off x="20" y="-10150"/>
+            <a:ext cx="12191980" cy="6857990"/>
+          </a:xfrm>
+          <a:prstGeom prst="rect">
+            <a:avLst/>
+          </a:prstGeom>
+        </p:spPr>
+      </p:pic>
+      <p:sp>
+        <p:nvSpPr>
+          <p:cNvPr id="14" name="Freeform 9">
+            <a:extLst>
+              <a:ext uri="{FF2B5EF4-FFF2-40B4-BE49-F238E27FC236}">
+                <a16:creationId xmlns:a16="http://schemas.microsoft.com/office/drawing/2014/main" id="{72319FFA-0E4F-4E0B-BEBA-A9DD4B41AAE9}"/>
+              </a:ext>
+              <a:ext uri="{C183D7F6-B498-43B3-948B-1728B52AA6E4}">
+                <adec:decorative xmlns:adec="http://schemas.microsoft.com/office/drawing/2017/decorative" xmlns="" val="1"/>
+              </a:ext>
+            </a:extLst>
+          </p:cNvPr>
+          <p:cNvSpPr>
+            <a:spLocks noGrp="1" noRot="1" noChangeAspect="1" noMove="1" noResize="1" noEditPoints="1" noAdjustHandles="1" noChangeArrowheads="1" noChangeShapeType="1" noTextEdit="1"/>
+          </p:cNvSpPr>
+          <p:nvPr>
+            <p:extLst>
+              <p:ext uri="{386F3935-93C4-4BCD-93E2-E3B085C9AB24}">
+                <p16:designElem xmlns:p16="http://schemas.microsoft.com/office/powerpoint/2015/main" val="1"/>
+              </p:ext>
+            </p:extLst>
+          </p:nvPr>
+        </p:nvSpPr>
+        <p:spPr bwMode="white">
+          <a:xfrm>
+            <a:off x="0" y="0"/>
+            <a:ext cx="6485467" cy="6858000"/>
+          </a:xfrm>
+          <a:custGeom>
+            <a:avLst/>
+            <a:gdLst>
+              <a:gd name="connsiteX0" fmla="*/ 0 w 6485467"/>
+              <a:gd name="connsiteY0" fmla="*/ 0 h 6858000"/>
+              <a:gd name="connsiteX1" fmla="*/ 6485467 w 6485467"/>
+              <a:gd name="connsiteY1" fmla="*/ 0 h 6858000"/>
+              <a:gd name="connsiteX2" fmla="*/ 6485467 w 6485467"/>
+              <a:gd name="connsiteY2" fmla="*/ 1900238 h 6858000"/>
+              <a:gd name="connsiteX3" fmla="*/ 6115051 w 6485467"/>
+              <a:gd name="connsiteY3" fmla="*/ 2178050 h 6858000"/>
+              <a:gd name="connsiteX4" fmla="*/ 6110817 w 6485467"/>
+              <a:gd name="connsiteY4" fmla="*/ 2184400 h 6858000"/>
+              <a:gd name="connsiteX5" fmla="*/ 6104467 w 6485467"/>
+              <a:gd name="connsiteY5" fmla="*/ 2193925 h 6858000"/>
+              <a:gd name="connsiteX6" fmla="*/ 6098117 w 6485467"/>
+              <a:gd name="connsiteY6" fmla="*/ 2201863 h 6858000"/>
+              <a:gd name="connsiteX7" fmla="*/ 6098117 w 6485467"/>
+              <a:gd name="connsiteY7" fmla="*/ 2211388 h 6858000"/>
+              <a:gd name="connsiteX8" fmla="*/ 6098117 w 6485467"/>
+              <a:gd name="connsiteY8" fmla="*/ 2220913 h 6858000"/>
+              <a:gd name="connsiteX9" fmla="*/ 6104467 w 6485467"/>
+              <a:gd name="connsiteY9" fmla="*/ 2228850 h 6858000"/>
+              <a:gd name="connsiteX10" fmla="*/ 6110817 w 6485467"/>
+              <a:gd name="connsiteY10" fmla="*/ 2238375 h 6858000"/>
+              <a:gd name="connsiteX11" fmla="*/ 6115051 w 6485467"/>
+              <a:gd name="connsiteY11" fmla="*/ 2244725 h 6858000"/>
+              <a:gd name="connsiteX12" fmla="*/ 6485467 w 6485467"/>
+              <a:gd name="connsiteY12" fmla="*/ 2522538 h 6858000"/>
+              <a:gd name="connsiteX13" fmla="*/ 6485467 w 6485467"/>
+              <a:gd name="connsiteY13" fmla="*/ 6858000 h 6858000"/>
+              <a:gd name="connsiteX14" fmla="*/ 0 w 6485467"/>
+              <a:gd name="connsiteY14" fmla="*/ 6858000 h 6858000"/>
+            </a:gdLst>
+            <a:ahLst/>
+            <a:cxnLst>
+              <a:cxn ang="0">
+                <a:pos x="connsiteX0" y="connsiteY0"/>
+              </a:cxn>
+              <a:cxn ang="0">
+                <a:pos x="connsiteX1" y="connsiteY1"/>
+              </a:cxn>
+              <a:cxn ang="0">
+                <a:pos x="connsiteX2" y="connsiteY2"/>
+              </a:cxn>
+              <a:cxn ang="0">
+                <a:pos x="connsiteX3" y="connsiteY3"/>
+              </a:cxn>
+              <a:cxn ang="0">
+                <a:pos x="connsiteX4" y="connsiteY4"/>
+              </a:cxn>
+              <a:cxn ang="0">
+                <a:pos x="connsiteX5" y="connsiteY5"/>
+              </a:cxn>
+              <a:cxn ang="0">
+                <a:pos x="connsiteX6" y="connsiteY6"/>
+              </a:cxn>
+              <a:cxn ang="0">
+                <a:pos x="connsiteX7" y="connsiteY7"/>
+              </a:cxn>
+              <a:cxn ang="0">
+                <a:pos x="connsiteX8" y="connsiteY8"/>
+              </a:cxn>
+              <a:cxn ang="0">
+                <a:pos x="connsiteX9" y="connsiteY9"/>
+              </a:cxn>
+              <a:cxn ang="0">
+                <a:pos x="connsiteX10" y="connsiteY10"/>
+              </a:cxn>
+              <a:cxn ang="0">
+                <a:pos x="connsiteX11" y="connsiteY11"/>
+              </a:cxn>
+              <a:cxn ang="0">
+                <a:pos x="connsiteX12" y="connsiteY12"/>
+              </a:cxn>
+              <a:cxn ang="0">
+                <a:pos x="connsiteX13" y="connsiteY13"/>
+              </a:cxn>
+              <a:cxn ang="0">
+                <a:pos x="connsiteX14" y="connsiteY14"/>
+              </a:cxn>
+            </a:cxnLst>
+            <a:rect l="l" t="t" r="r" b="b"/>
+            <a:pathLst>
+              <a:path w="6485467" h="6858000">
+                <a:moveTo>
+                  <a:pt x="0" y="0"/>
+                </a:moveTo>
+                <a:lnTo>
+                  <a:pt x="6485467" y="0"/>
+                </a:lnTo>
+                <a:lnTo>
+                  <a:pt x="6485467" y="1900238"/>
+                </a:lnTo>
+                <a:lnTo>
+                  <a:pt x="6115051" y="2178050"/>
+                </a:lnTo>
+                <a:lnTo>
+                  <a:pt x="6110817" y="2184400"/>
+                </a:lnTo>
+                <a:lnTo>
+                  <a:pt x="6104467" y="2193925"/>
+                </a:lnTo>
+                <a:lnTo>
+                  <a:pt x="6098117" y="2201863"/>
+                </a:lnTo>
+                <a:lnTo>
+                  <a:pt x="6098117" y="2211388"/>
+                </a:lnTo>
+                <a:lnTo>
+                  <a:pt x="6098117" y="2220913"/>
+                </a:lnTo>
+                <a:lnTo>
+                  <a:pt x="6104467" y="2228850"/>
+                </a:lnTo>
+                <a:lnTo>
+                  <a:pt x="6110817" y="2238375"/>
+                </a:lnTo>
+                <a:lnTo>
+                  <a:pt x="6115051" y="2244725"/>
+                </a:lnTo>
+                <a:lnTo>
+                  <a:pt x="6485467" y="2522538"/>
+                </a:lnTo>
+                <a:lnTo>
+                  <a:pt x="6485467" y="6858000"/>
+                </a:lnTo>
+                <a:lnTo>
+                  <a:pt x="0" y="6858000"/>
+                </a:lnTo>
+                <a:close/>
+              </a:path>
+            </a:pathLst>
+          </a:custGeom>
+          <a:solidFill>
+            <a:schemeClr val="bg1">
+              <a:lumMod val="85000"/>
+              <a:lumOff val="15000"/>
+              <a:alpha val="90000"/>
+            </a:schemeClr>
+          </a:solidFill>
+          <a:ln>
+            <a:noFill/>
+          </a:ln>
+          <a:effectLst/>
+        </p:spPr>
+        <p:style>
+          <a:lnRef idx="2">
+            <a:schemeClr val="accent1">
+              <a:shade val="50000"/>
+            </a:schemeClr>
+          </a:lnRef>
+          <a:fillRef idx="1">
+            <a:schemeClr val="accent1"/>
+          </a:fillRef>
+          <a:effectRef idx="0">
+            <a:schemeClr val="accent1"/>
+          </a:effectRef>
+          <a:fontRef idx="minor">
+            <a:schemeClr val="lt1"/>
+          </a:fontRef>
+        </p:style>
+        <p:txBody>
+          <a:bodyPr rtlCol="0" anchor="ctr"/>
+          <a:lstStyle/>
+          <a:p>
+            <a:pPr algn="ctr"/>
+            <a:endParaRPr lang="en-US"/>
+          </a:p>
+        </p:txBody>
+      </p:sp>
+      <p:sp>
+        <p:nvSpPr>
+          <p:cNvPr id="2" name="Title 1"/>
+          <p:cNvSpPr>
+            <a:spLocks noGrp="1"/>
+          </p:cNvSpPr>
+          <p:nvPr>
+            <p:ph type="title"/>
+          </p:nvPr>
+        </p:nvSpPr>
+        <p:spPr>
+          <a:xfrm>
+            <a:off x="810000" y="447188"/>
+            <a:ext cx="4930400" cy="1559412"/>
+          </a:xfrm>
+        </p:spPr>
+        <p:txBody>
+          <a:bodyPr>
+            <a:normAutofit/>
+          </a:bodyPr>
+          <a:lstStyle/>
+          <a:p>
+            <a:r>
+              <a:rPr lang="en-US" dirty="0"/>
+              <a:t>Our Data Process</a:t>
+            </a:r>
+          </a:p>
+        </p:txBody>
+      </p:sp>
+      <p:sp>
+        <p:nvSpPr>
+          <p:cNvPr id="3" name="Content Placeholder 2"/>
+          <p:cNvSpPr>
+            <a:spLocks noGrp="1"/>
+          </p:cNvSpPr>
+          <p:nvPr>
+            <p:ph idx="1"/>
+          </p:nvPr>
+        </p:nvSpPr>
+        <p:spPr>
+          <a:xfrm>
+            <a:off x="818712" y="2413000"/>
+            <a:ext cx="4921687" cy="3632200"/>
+          </a:xfrm>
+        </p:spPr>
+        <p:txBody>
+          <a:bodyPr>
+            <a:normAutofit/>
+          </a:bodyPr>
+          <a:lstStyle/>
+          <a:p>
+            <a:r>
+              <a:rPr lang="en-US" dirty="0"/>
+              <a:t>Export CSVs into </a:t>
+            </a:r>
+            <a:r>
+              <a:rPr lang="en-US" dirty="0" err="1"/>
+              <a:t>Jupyter</a:t>
+            </a:r>
+            <a:r>
+              <a:rPr lang="en-US" dirty="0"/>
+              <a:t> Notebook</a:t>
+            </a:r>
+          </a:p>
+          <a:p>
+            <a:r>
+              <a:rPr lang="en-US" dirty="0"/>
+              <a:t>Begin determining the data we wanted to analyze</a:t>
+            </a:r>
+          </a:p>
+          <a:p>
+            <a:r>
+              <a:rPr lang="en-US" dirty="0"/>
+              <a:t>Cleaned the data</a:t>
+            </a:r>
+          </a:p>
+          <a:p>
+            <a:r>
+              <a:rPr lang="en-US" dirty="0"/>
+              <a:t>Created tables with the relevant data</a:t>
+            </a:r>
+          </a:p>
+          <a:p>
+            <a:r>
+              <a:rPr lang="en-US" dirty="0"/>
+              <a:t>Plotted charts with the data</a:t>
+            </a:r>
+          </a:p>
+          <a:p>
+            <a:r>
+              <a:rPr lang="en-US" dirty="0"/>
+              <a:t>Analyzed the results</a:t>
+            </a:r>
+          </a:p>
+          <a:p>
+            <a:endParaRPr lang="en-US" dirty="0"/>
+          </a:p>
+        </p:txBody>
+      </p:sp>
+    </p:spTree>
+    <p:extLst>
+      <p:ext uri="{BB962C8B-B14F-4D97-AF65-F5344CB8AC3E}">
+        <p14:creationId xmlns:p14="http://schemas.microsoft.com/office/powerpoint/2010/main" val="1793143983"/>
+      </p:ext>
+    </p:extLst>
+  </p:cSld>
+  <p:clrMapOvr>
+    <a:masterClrMapping/>
+  </p:clrMapOvr>
+</p:sld>
+</file>
+
+<file path=ppt/slides/slide11.xml><?xml version="1.0" encoding="utf-8"?>
+<p:sld xmlns:a="http://schemas.openxmlformats.org/drawingml/2006/main" xmlns:r="http://schemas.openxmlformats.org/officeDocument/2006/relationships" xmlns:p="http://schemas.openxmlformats.org/presentationml/2006/main">
+  <p:cSld>
+    <p:bg>
+      <p:bgPr>
+        <a:solidFill>
           <a:schemeClr val="bg1"/>
         </a:solidFill>
         <a:effectLst/>
@@ -5629,7 +5997,7 @@
                 <a16:creationId xmlns:a16="http://schemas.microsoft.com/office/drawing/2014/main" id="{E2264E67-6F59-4D8D-8E5F-8245B0FEAE76}"/>
               </a:ext>
               <a:ext uri="{C183D7F6-B498-43B3-948B-1728B52AA6E4}">
-                <adec:decorative xmlns:adec="http://schemas.microsoft.com/office/drawing/2017/decorative" val="1"/>
+                <adec:decorative xmlns:adec="http://schemas.microsoft.com/office/drawing/2017/decorative" xmlns="" val="1"/>
               </a:ext>
             </a:extLst>
           </p:cNvPr>
@@ -5692,7 +6060,7 @@
                 <a16:creationId xmlns:a16="http://schemas.microsoft.com/office/drawing/2014/main" id="{158E1C6E-D299-4F5D-B15B-155EBF7F62FD}"/>
               </a:ext>
               <a:ext uri="{C183D7F6-B498-43B3-948B-1728B52AA6E4}">
-                <adec:decorative xmlns:adec="http://schemas.microsoft.com/office/drawing/2017/decorative" val="1"/>
+                <adec:decorative xmlns:adec="http://schemas.microsoft.com/office/drawing/2017/decorative" xmlns="" val="1"/>
               </a:ext>
             </a:extLst>
           </p:cNvPr>
@@ -6038,7 +6406,7 @@
 </p:sld>
 </file>
 
-<file path=ppt/slides/slide11.xml><?xml version="1.0" encoding="utf-8"?>
+<file path=ppt/slides/slide12.xml><?xml version="1.0" encoding="utf-8"?>
 <p:sld xmlns:a="http://schemas.openxmlformats.org/drawingml/2006/main" xmlns:r="http://schemas.openxmlformats.org/officeDocument/2006/relationships" xmlns:p="http://schemas.openxmlformats.org/presentationml/2006/main">
   <p:cSld>
     <p:bg>
@@ -6071,7 +6439,7 @@
                 <a16:creationId xmlns:a16="http://schemas.microsoft.com/office/drawing/2014/main" id="{E2264E67-6F59-4D8D-8E5F-8245B0FEAE76}"/>
               </a:ext>
               <a:ext uri="{C183D7F6-B498-43B3-948B-1728B52AA6E4}">
-                <adec:decorative xmlns:adec="http://schemas.microsoft.com/office/drawing/2017/decorative" val="1"/>
+                <adec:decorative xmlns:adec="http://schemas.microsoft.com/office/drawing/2017/decorative" xmlns="" val="1"/>
               </a:ext>
             </a:extLst>
           </p:cNvPr>
@@ -6134,7 +6502,7 @@
                 <a16:creationId xmlns:a16="http://schemas.microsoft.com/office/drawing/2014/main" id="{158E1C6E-D299-4F5D-B15B-155EBF7F62FD}"/>
               </a:ext>
               <a:ext uri="{C183D7F6-B498-43B3-948B-1728B52AA6E4}">
-                <adec:decorative xmlns:adec="http://schemas.microsoft.com/office/drawing/2017/decorative" val="1"/>
+                <adec:decorative xmlns:adec="http://schemas.microsoft.com/office/drawing/2017/decorative" xmlns="" val="1"/>
               </a:ext>
             </a:extLst>
           </p:cNvPr>
@@ -6480,7 +6848,7 @@
 </p:sld>
 </file>
 
-<file path=ppt/slides/slide12.xml><?xml version="1.0" encoding="utf-8"?>
+<file path=ppt/slides/slide13.xml><?xml version="1.0" encoding="utf-8"?>
 <p:sld xmlns:a="http://schemas.openxmlformats.org/drawingml/2006/main" xmlns:r="http://schemas.openxmlformats.org/officeDocument/2006/relationships" xmlns:p="http://schemas.openxmlformats.org/presentationml/2006/main">
   <p:cSld>
     <p:bg>
@@ -6513,7 +6881,7 @@
                 <a16:creationId xmlns:a16="http://schemas.microsoft.com/office/drawing/2014/main" id="{E2264E67-6F59-4D8D-8E5F-8245B0FEAE76}"/>
               </a:ext>
               <a:ext uri="{C183D7F6-B498-43B3-948B-1728B52AA6E4}">
-                <adec:decorative xmlns:adec="http://schemas.microsoft.com/office/drawing/2017/decorative" val="1"/>
+                <adec:decorative xmlns:adec="http://schemas.microsoft.com/office/drawing/2017/decorative" xmlns="" val="1"/>
               </a:ext>
             </a:extLst>
           </p:cNvPr>
@@ -6576,7 +6944,7 @@
                 <a16:creationId xmlns:a16="http://schemas.microsoft.com/office/drawing/2014/main" id="{158E1C6E-D299-4F5D-B15B-155EBF7F62FD}"/>
               </a:ext>
               <a:ext uri="{C183D7F6-B498-43B3-948B-1728B52AA6E4}">
-                <adec:decorative xmlns:adec="http://schemas.microsoft.com/office/drawing/2017/decorative" val="1"/>
+                <adec:decorative xmlns:adec="http://schemas.microsoft.com/office/drawing/2017/decorative" xmlns="" val="1"/>
               </a:ext>
             </a:extLst>
           </p:cNvPr>
@@ -6940,7 +7308,7 @@
 </p:sld>
 </file>
 
-<file path=ppt/slides/slide13.xml><?xml version="1.0" encoding="utf-8"?>
+<file path=ppt/slides/slide14.xml><?xml version="1.0" encoding="utf-8"?>
 <p:sld xmlns:a="http://schemas.openxmlformats.org/drawingml/2006/main" xmlns:r="http://schemas.openxmlformats.org/officeDocument/2006/relationships" xmlns:p="http://schemas.openxmlformats.org/presentationml/2006/main">
   <p:cSld>
     <p:bg>
@@ -6973,7 +7341,7 @@
                 <a16:creationId xmlns:a16="http://schemas.microsoft.com/office/drawing/2014/main" id="{E2264E67-6F59-4D8D-8E5F-8245B0FEAE76}"/>
               </a:ext>
               <a:ext uri="{C183D7F6-B498-43B3-948B-1728B52AA6E4}">
-                <adec:decorative xmlns:adec="http://schemas.microsoft.com/office/drawing/2017/decorative" val="1"/>
+                <adec:decorative xmlns:adec="http://schemas.microsoft.com/office/drawing/2017/decorative" xmlns="" val="1"/>
               </a:ext>
             </a:extLst>
           </p:cNvPr>
@@ -7036,7 +7404,7 @@
                 <a16:creationId xmlns:a16="http://schemas.microsoft.com/office/drawing/2014/main" id="{158E1C6E-D299-4F5D-B15B-155EBF7F62FD}"/>
               </a:ext>
               <a:ext uri="{C183D7F6-B498-43B3-948B-1728B52AA6E4}">
-                <adec:decorative xmlns:adec="http://schemas.microsoft.com/office/drawing/2017/decorative" val="1"/>
+                <adec:decorative xmlns:adec="http://schemas.microsoft.com/office/drawing/2017/decorative" xmlns="" val="1"/>
               </a:ext>
             </a:extLst>
           </p:cNvPr>
@@ -7436,7 +7804,7 @@
 </p:sld>
 </file>
 
-<file path=ppt/slides/slide14.xml><?xml version="1.0" encoding="utf-8"?>
+<file path=ppt/slides/slide15.xml><?xml version="1.0" encoding="utf-8"?>
 <p:sld xmlns:a="http://schemas.openxmlformats.org/drawingml/2006/main" xmlns:r="http://schemas.openxmlformats.org/officeDocument/2006/relationships" xmlns:p="http://schemas.openxmlformats.org/presentationml/2006/main">
   <p:cSld>
     <p:bg>
@@ -7469,7 +7837,7 @@
                 <a16:creationId xmlns:a16="http://schemas.microsoft.com/office/drawing/2014/main" id="{E2264E67-6F59-4D8D-8E5F-8245B0FEAE76}"/>
               </a:ext>
               <a:ext uri="{C183D7F6-B498-43B3-948B-1728B52AA6E4}">
-                <adec:decorative xmlns:adec="http://schemas.microsoft.com/office/drawing/2017/decorative" val="1"/>
+                <adec:decorative xmlns:adec="http://schemas.microsoft.com/office/drawing/2017/decorative" xmlns="" val="1"/>
               </a:ext>
             </a:extLst>
           </p:cNvPr>
@@ -7532,7 +7900,7 @@
                 <a16:creationId xmlns:a16="http://schemas.microsoft.com/office/drawing/2014/main" id="{158E1C6E-D299-4F5D-B15B-155EBF7F62FD}"/>
               </a:ext>
               <a:ext uri="{C183D7F6-B498-43B3-948B-1728B52AA6E4}">
-                <adec:decorative xmlns:adec="http://schemas.microsoft.com/office/drawing/2017/decorative" val="1"/>
+                <adec:decorative xmlns:adec="http://schemas.microsoft.com/office/drawing/2017/decorative" xmlns="" val="1"/>
               </a:ext>
             </a:extLst>
           </p:cNvPr>
@@ -7931,7 +8299,7 @@
 </p:sld>
 </file>
 
-<file path=ppt/slides/slide15.xml><?xml version="1.0" encoding="utf-8"?>
+<file path=ppt/slides/slide16.xml><?xml version="1.0" encoding="utf-8"?>
 <p:sld xmlns:a="http://schemas.openxmlformats.org/drawingml/2006/main" xmlns:r="http://schemas.openxmlformats.org/officeDocument/2006/relationships" xmlns:p="http://schemas.openxmlformats.org/presentationml/2006/main">
   <p:cSld>
     <p:bg>
@@ -7964,7 +8332,7 @@
                 <a16:creationId xmlns:a16="http://schemas.microsoft.com/office/drawing/2014/main" id="{E2264E67-6F59-4D8D-8E5F-8245B0FEAE76}"/>
               </a:ext>
               <a:ext uri="{C183D7F6-B498-43B3-948B-1728B52AA6E4}">
-                <adec:decorative xmlns:adec="http://schemas.microsoft.com/office/drawing/2017/decorative" val="1"/>
+                <adec:decorative xmlns:adec="http://schemas.microsoft.com/office/drawing/2017/decorative" xmlns="" val="1"/>
               </a:ext>
             </a:extLst>
           </p:cNvPr>
@@ -8027,7 +8395,7 @@
                 <a16:creationId xmlns:a16="http://schemas.microsoft.com/office/drawing/2014/main" id="{158E1C6E-D299-4F5D-B15B-155EBF7F62FD}"/>
               </a:ext>
               <a:ext uri="{C183D7F6-B498-43B3-948B-1728B52AA6E4}">
-                <adec:decorative xmlns:adec="http://schemas.microsoft.com/office/drawing/2017/decorative" val="1"/>
+                <adec:decorative xmlns:adec="http://schemas.microsoft.com/office/drawing/2017/decorative" xmlns="" val="1"/>
               </a:ext>
             </a:extLst>
           </p:cNvPr>
@@ -8411,7 +8779,7 @@
 </p:sld>
 </file>
 
-<file path=ppt/slides/slide16.xml><?xml version="1.0" encoding="utf-8"?>
+<file path=ppt/slides/slide17.xml><?xml version="1.0" encoding="utf-8"?>
 <p:sld xmlns:a="http://schemas.openxmlformats.org/drawingml/2006/main" xmlns:r="http://schemas.openxmlformats.org/officeDocument/2006/relationships" xmlns:p="http://schemas.openxmlformats.org/presentationml/2006/main">
   <p:cSld>
     <p:bg>
@@ -8444,7 +8812,7 @@
                 <a16:creationId xmlns:a16="http://schemas.microsoft.com/office/drawing/2014/main" id="{089A69AF-D57B-49B4-886C-D4A5DC194421}"/>
               </a:ext>
               <a:ext uri="{C183D7F6-B498-43B3-948B-1728B52AA6E4}">
-                <adec:decorative xmlns:adec="http://schemas.microsoft.com/office/drawing/2017/decorative" val="1"/>
+                <adec:decorative xmlns:adec="http://schemas.microsoft.com/office/drawing/2017/decorative" xmlns="" val="1"/>
               </a:ext>
             </a:extLst>
           </p:cNvPr>
@@ -8504,7 +8872,7 @@
                 <a16:creationId xmlns:a16="http://schemas.microsoft.com/office/drawing/2014/main" id="{CABDC08D-6093-4397-92D4-54D00E2BB1C2}"/>
               </a:ext>
               <a:ext uri="{C183D7F6-B498-43B3-948B-1728B52AA6E4}">
-                <adec:decorative xmlns:adec="http://schemas.microsoft.com/office/drawing/2017/decorative" val="1"/>
+                <adec:decorative xmlns:adec="http://schemas.microsoft.com/office/drawing/2017/decorative" xmlns="" val="1"/>
               </a:ext>
             </a:extLst>
           </p:cNvPr>
@@ -8709,7 +9077,7 @@
           <a:effectLst/>
           <a:extLst>
             <a:ext uri="{91240B29-F687-4f45-9708-019B960494DF}">
-              <a14:hiddenLine xmlns="" xmlns:a16="http://schemas.microsoft.com/office/drawing/2014/main" xmlns:p14="http://schemas.microsoft.com/office/powerpoint/2010/main" xmlns:a14="http://schemas.microsoft.com/office/drawing/2010/main" w="9525">
+              <a14:hiddenLine xmlns:a14="http://schemas.microsoft.com/office/drawing/2010/main" xmlns:p14="http://schemas.microsoft.com/office/powerpoint/2010/main" xmlns:a16="http://schemas.microsoft.com/office/drawing/2014/main" xmlns="" w="9525">
                 <a:solidFill>
                   <a:srgbClr val="000000"/>
                 </a:solidFill>
@@ -8841,7 +9209,7 @@
 </p:sld>
 </file>
 
-<file path=ppt/slides/slide17.xml><?xml version="1.0" encoding="utf-8"?>
+<file path=ppt/slides/slide18.xml><?xml version="1.0" encoding="utf-8"?>
 <p:sld xmlns:a="http://schemas.openxmlformats.org/drawingml/2006/main" xmlns:r="http://schemas.openxmlformats.org/officeDocument/2006/relationships" xmlns:p="http://schemas.openxmlformats.org/presentationml/2006/main">
   <p:cSld>
     <p:bg>
@@ -8874,7 +9242,7 @@
                 <a16:creationId xmlns:a16="http://schemas.microsoft.com/office/drawing/2014/main" id="{F1E0D4A3-ECB8-4689-ABDB-9CE848CE83B9}"/>
               </a:ext>
               <a:ext uri="{C183D7F6-B498-43B3-948B-1728B52AA6E4}">
-                <adec:decorative xmlns:adec="http://schemas.microsoft.com/office/drawing/2017/decorative" val="1"/>
+                <adec:decorative xmlns:adec="http://schemas.microsoft.com/office/drawing/2017/decorative" xmlns="" val="1"/>
               </a:ext>
             </a:extLst>
           </p:cNvPr>
@@ -8975,7 +9343,7 @@
                 <a16:creationId xmlns:a16="http://schemas.microsoft.com/office/drawing/2014/main" id="{8854772B-9C8F-4037-89E0-3A45208AB395}"/>
               </a:ext>
               <a:ext uri="{C183D7F6-B498-43B3-948B-1728B52AA6E4}">
-                <adec:decorative xmlns:adec="http://schemas.microsoft.com/office/drawing/2017/decorative" val="1"/>
+                <adec:decorative xmlns:adec="http://schemas.microsoft.com/office/drawing/2017/decorative" xmlns="" val="1"/>
               </a:ext>
             </a:extLst>
           </p:cNvPr>
@@ -9277,7 +9645,7 @@
 </p:sld>
 </file>
 
-<file path=ppt/slides/slide18.xml><?xml version="1.0" encoding="utf-8"?>
+<file path=ppt/slides/slide19.xml><?xml version="1.0" encoding="utf-8"?>
 <p:sld xmlns:a="http://schemas.openxmlformats.org/drawingml/2006/main" xmlns:r="http://schemas.openxmlformats.org/officeDocument/2006/relationships" xmlns:p="http://schemas.openxmlformats.org/presentationml/2006/main">
   <p:cSld>
     <p:spTree>
@@ -9358,16 +9726,22 @@
               <a:rPr lang="en-US" sz="1400" dirty="0">
                 <a:hlinkClick r:id="rId4"/>
               </a:rPr>
-              <a:t>https://s3.amazonaws.com/uber-static/comms/PDF/Uber_Driver-Partners_Hall_Kreuger_2015.pdf</a:t>
-            </a:r>
-            <a:endParaRPr lang="en-US" sz="1400" dirty="0"/>
+              <a:t>https://</a:t>
+            </a:r>
+            <a:r>
+              <a:rPr lang="en-US" sz="1400" dirty="0" smtClean="0">
+                <a:hlinkClick r:id="rId4"/>
+              </a:rPr>
+              <a:t>s3.amazonaws.com/uber-static/comms/PDF/Uber_Driver-Partners_Hall_Kreuger_2015.pdf</a:t>
+            </a:r>
+            <a:endParaRPr lang="en-US" sz="1400" dirty="0" smtClean="0"/>
           </a:p>
           <a:p>
             <a:r>
               <a:rPr lang="en-US" sz="1400" dirty="0">
                 <a:hlinkClick r:id="rId5"/>
               </a:rPr>
-              <a:t>https://en.wikipedia.org/wiki/Transportation_network_company</a:t>
+              <a:t>https://www.forbes.com/sites/briansolomon/2017/01/05/lyft-rides-tripled-last-year-but-remains-far-behind-uber/#7c1a1789199e</a:t>
             </a:r>
             <a:endParaRPr lang="en-US" sz="1400" dirty="0"/>
           </a:p>
@@ -9376,27 +9750,27 @@
               <a:rPr lang="en-US" sz="1400" dirty="0">
                 <a:hlinkClick r:id="rId6"/>
               </a:rPr>
-              <a:t>https://en.wikipedia.org/wiki/DUI_laws_in_California</a:t>
-            </a:r>
-            <a:endParaRPr lang="en-US" sz="1400" dirty="0">
-              <a:hlinkClick r:id="rId7"/>
-            </a:endParaRPr>
+              <a:t>https://en.wikipedia.org/wiki/Transportation_network_company</a:t>
+            </a:r>
+            <a:endParaRPr lang="en-US" sz="1400" dirty="0"/>
           </a:p>
           <a:p>
             <a:r>
               <a:rPr lang="en-US" sz="1400" dirty="0">
                 <a:hlinkClick r:id="rId7"/>
               </a:rPr>
-              <a:t>https://www.nhtsa.gov/risky-driving/drunk-driving#age-5056</a:t>
-            </a:r>
-            <a:endParaRPr lang="en-US" sz="1400" dirty="0"/>
+              <a:t>https://en.wikipedia.org/wiki/DUI_laws_in_California</a:t>
+            </a:r>
+            <a:endParaRPr lang="en-US" sz="1400" dirty="0">
+              <a:hlinkClick r:id="rId8"/>
+            </a:endParaRPr>
           </a:p>
           <a:p>
             <a:r>
               <a:rPr lang="en-US" sz="1400" dirty="0">
                 <a:hlinkClick r:id="rId8"/>
               </a:rPr>
-              <a:t>https://mrcheckpoint.com/can-i-get-a-dui-removed-from-my-record-in-california/</a:t>
+              <a:t>https://www.nhtsa.gov/risky-driving/drunk-driving#age-5056</a:t>
             </a:r>
             <a:endParaRPr lang="en-US" sz="1400" dirty="0"/>
           </a:p>
@@ -9405,7 +9779,7 @@
               <a:rPr lang="en-US" sz="1400" dirty="0">
                 <a:hlinkClick r:id="rId9"/>
               </a:rPr>
-              <a:t>https://www.edhat.com/news/dui-suspected-in-rollover-accident</a:t>
+              <a:t>https://mrcheckpoint.com/can-i-get-a-dui-removed-from-my-record-in-california/</a:t>
             </a:r>
             <a:endParaRPr lang="en-US" sz="1400" dirty="0"/>
           </a:p>
@@ -9413,6 +9787,15 @@
             <a:r>
               <a:rPr lang="en-US" sz="1400" dirty="0">
                 <a:hlinkClick r:id="rId10"/>
+              </a:rPr>
+              <a:t>https://www.edhat.com/news/dui-suspected-in-rollover-accident</a:t>
+            </a:r>
+            <a:endParaRPr lang="en-US" sz="1400" dirty="0"/>
+          </a:p>
+          <a:p>
+            <a:r>
+              <a:rPr lang="en-US" sz="1400" dirty="0">
+                <a:hlinkClick r:id="rId11"/>
               </a:rPr>
               <a:t>https://catalog.data.gov/dataset/impaired-driving-death-rate-by-age-and-gender-2012-all-states-587fd</a:t>
             </a:r>
@@ -9683,24 +10066,22 @@
               <a:rPr lang="en-US" dirty="0"/>
               <a:t>, a ridesharing company the two founded in 2007 </a:t>
             </a:r>
-          </a:p>
-          <a:p>
+            <a:endParaRPr lang="en-US" dirty="0" smtClean="0"/>
+          </a:p>
+          <a:p>
+            <a:r>
+              <a:rPr lang="en-US" dirty="0" smtClean="0"/>
+              <a:t>Revenue of $</a:t>
+            </a:r>
             <a:r>
               <a:rPr lang="en-US" dirty="0"/>
-              <a:t>By 2013, Lyft was providing 30,000 rides a week</a:t>
-            </a:r>
-          </a:p>
-          <a:p>
-            <a:r>
-              <a:rPr lang="en-US" dirty="0"/>
-              <a:t>August 2013, it hits a million completed rides.</a:t>
-            </a:r>
-          </a:p>
-          <a:p>
-            <a:r>
-              <a:rPr lang="en-US" dirty="0"/>
-              <a:t>April 2014, Lyft had become available in 60 U.S. cities.</a:t>
-            </a:r>
+              <a:t>2.157 </a:t>
+            </a:r>
+            <a:r>
+              <a:rPr lang="en-US" dirty="0" smtClean="0"/>
+              <a:t>billion as of 2018</a:t>
+            </a:r>
+            <a:endParaRPr lang="en-US" dirty="0"/>
           </a:p>
         </p:txBody>
       </p:sp>
@@ -9791,6 +10172,172 @@
           <a:lstStyle/>
           <a:p>
             <a:r>
+              <a:rPr lang="en-US" dirty="0" smtClean="0"/>
+              <a:t>Lyft</a:t>
+            </a:r>
+            <a:endParaRPr lang="en-US" dirty="0"/>
+          </a:p>
+        </p:txBody>
+      </p:sp>
+      <p:sp>
+        <p:nvSpPr>
+          <p:cNvPr id="3" name="Content Placeholder 2"/>
+          <p:cNvSpPr>
+            <a:spLocks noGrp="1"/>
+          </p:cNvSpPr>
+          <p:nvPr>
+            <p:ph idx="1"/>
+          </p:nvPr>
+        </p:nvSpPr>
+        <p:spPr>
+          <a:xfrm>
+            <a:off x="818712" y="2222287"/>
+            <a:ext cx="4925383" cy="3636511"/>
+          </a:xfrm>
+        </p:spPr>
+        <p:txBody>
+          <a:bodyPr anchor="t"/>
+          <a:lstStyle/>
+          <a:p>
+            <a:r>
+              <a:rPr lang="en-US" dirty="0"/>
+              <a:t>By 2013, Lyft was providing 30,000 rides a week</a:t>
+            </a:r>
+          </a:p>
+          <a:p>
+            <a:r>
+              <a:rPr lang="en-US" dirty="0" smtClean="0"/>
+              <a:t>By the end of 2013</a:t>
+            </a:r>
+            <a:r>
+              <a:rPr lang="en-US" dirty="0"/>
+              <a:t>, it hits </a:t>
+            </a:r>
+            <a:r>
+              <a:rPr lang="en-US" dirty="0" smtClean="0"/>
+              <a:t>2.7 million completed rides</a:t>
+            </a:r>
+            <a:endParaRPr lang="en-US" dirty="0"/>
+          </a:p>
+          <a:p>
+            <a:r>
+              <a:rPr lang="en-US" dirty="0"/>
+              <a:t>April 2014, Lyft had become available in 60 U.S. </a:t>
+            </a:r>
+            <a:r>
+              <a:rPr lang="en-US" dirty="0" smtClean="0"/>
+              <a:t>cities</a:t>
+            </a:r>
+          </a:p>
+          <a:p>
+            <a:r>
+              <a:rPr lang="en-US" dirty="0" smtClean="0"/>
+              <a:t>By the end of 2014, they hit 18.1 </a:t>
+            </a:r>
+            <a:r>
+              <a:rPr lang="en-US" dirty="0"/>
+              <a:t>million </a:t>
+            </a:r>
+            <a:r>
+              <a:rPr lang="en-US" dirty="0" smtClean="0"/>
+              <a:t>completed rides</a:t>
+            </a:r>
+          </a:p>
+          <a:p>
+            <a:endParaRPr lang="en-US" dirty="0"/>
+          </a:p>
+          <a:p>
+            <a:endParaRPr lang="en-US" dirty="0"/>
+          </a:p>
+        </p:txBody>
+      </p:sp>
+      <p:pic>
+        <p:nvPicPr>
+          <p:cNvPr id="1026" name="Picture 2" descr="lyft ride growth vs uber 2016"/>
+          <p:cNvPicPr>
+            <a:picLocks noChangeAspect="1" noChangeArrowheads="1"/>
+          </p:cNvPicPr>
+          <p:nvPr/>
+        </p:nvPicPr>
+        <p:blipFill>
+          <a:blip r:embed="rId2">
+            <a:extLst>
+              <a:ext uri="{28A0092B-C50C-407E-A947-70E740481C1C}">
+                <a14:useLocalDpi xmlns:a14="http://schemas.microsoft.com/office/drawing/2010/main" val="0"/>
+              </a:ext>
+            </a:extLst>
+          </a:blip>
+          <a:srcRect/>
+          <a:stretch>
+            <a:fillRect/>
+          </a:stretch>
+        </p:blipFill>
+        <p:spPr bwMode="auto">
+          <a:xfrm>
+            <a:off x="6036023" y="2359831"/>
+            <a:ext cx="5865436" cy="3617019"/>
+          </a:xfrm>
+          <a:prstGeom prst="rect">
+            <a:avLst/>
+          </a:prstGeom>
+          <a:noFill/>
+          <a:extLst>
+            <a:ext uri="{909E8E84-426E-40DD-AFC4-6F175D3DCCD1}">
+              <a14:hiddenFill xmlns:a14="http://schemas.microsoft.com/office/drawing/2010/main">
+                <a:solidFill>
+                  <a:srgbClr val="FFFFFF"/>
+                </a:solidFill>
+              </a14:hiddenFill>
+            </a:ext>
+          </a:extLst>
+        </p:spPr>
+      </p:pic>
+    </p:spTree>
+    <p:extLst>
+      <p:ext uri="{BB962C8B-B14F-4D97-AF65-F5344CB8AC3E}">
+        <p14:creationId xmlns:p14="http://schemas.microsoft.com/office/powerpoint/2010/main" val="3820720817"/>
+      </p:ext>
+    </p:extLst>
+  </p:cSld>
+  <p:clrMapOvr>
+    <a:masterClrMapping/>
+  </p:clrMapOvr>
+</p:sld>
+</file>
+
+<file path=ppt/slides/slide5.xml><?xml version="1.0" encoding="utf-8"?>
+<p:sld xmlns:a="http://schemas.openxmlformats.org/drawingml/2006/main" xmlns:r="http://schemas.openxmlformats.org/officeDocument/2006/relationships" xmlns:p="http://schemas.openxmlformats.org/presentationml/2006/main">
+  <p:cSld>
+    <p:spTree>
+      <p:nvGrpSpPr>
+        <p:cNvPr id="1" name=""/>
+        <p:cNvGrpSpPr/>
+        <p:nvPr/>
+      </p:nvGrpSpPr>
+      <p:grpSpPr>
+        <a:xfrm>
+          <a:off x="0" y="0"/>
+          <a:ext cx="0" cy="0"/>
+          <a:chOff x="0" y="0"/>
+          <a:chExt cx="0" cy="0"/>
+        </a:xfrm>
+      </p:grpSpPr>
+      <p:sp>
+        <p:nvSpPr>
+          <p:cNvPr id="2" name="Title 1"/>
+          <p:cNvSpPr>
+            <a:spLocks noGrp="1"/>
+          </p:cNvSpPr>
+          <p:nvPr>
+            <p:ph type="title"/>
+          </p:nvPr>
+        </p:nvSpPr>
+        <p:spPr/>
+        <p:txBody>
+          <a:bodyPr/>
+          <a:lstStyle/>
+          <a:p>
+            <a:r>
               <a:rPr lang="en-US" dirty="0"/>
               <a:t>Uber</a:t>
             </a:r>
@@ -9834,39 +10381,54 @@
           </a:p>
           <a:p>
             <a:r>
+              <a:rPr lang="en-US" dirty="0" smtClean="0"/>
+              <a:t>Revenue of $</a:t>
+            </a:r>
+            <a:r>
               <a:rPr lang="en-US" dirty="0"/>
-              <a:t>Other Uber ventures:</a:t>
+              <a:t>11.3 billion</a:t>
+            </a:r>
+            <a:endParaRPr lang="en-US" dirty="0" smtClean="0"/>
+          </a:p>
+          <a:p>
+            <a:r>
+              <a:rPr lang="en-US" dirty="0" smtClean="0"/>
+              <a:t>Other </a:t>
+            </a:r>
+            <a:r>
+              <a:rPr lang="en-US" dirty="0"/>
+              <a:t>Uber ventures:</a:t>
             </a:r>
           </a:p>
           <a:p>
             <a:pPr lvl="1"/>
             <a:r>
-              <a:rPr lang="en-US" dirty="0"/>
+              <a:rPr lang="en-US" sz="1800" dirty="0"/>
               <a:t>Self-driving technology</a:t>
             </a:r>
           </a:p>
           <a:p>
             <a:pPr lvl="1"/>
             <a:r>
-              <a:rPr lang="en-US" dirty="0"/>
+              <a:rPr lang="en-US" sz="1800" dirty="0"/>
               <a:t>Uber Air</a:t>
             </a:r>
           </a:p>
           <a:p>
             <a:pPr lvl="1"/>
             <a:r>
-              <a:rPr lang="en-US" dirty="0"/>
+              <a:rPr lang="en-US" sz="1800" dirty="0"/>
               <a:t>Uber Eats</a:t>
             </a:r>
           </a:p>
           <a:p>
             <a:pPr lvl="1"/>
             <a:r>
-              <a:rPr lang="en-US" dirty="0" err="1"/>
+              <a:rPr lang="en-US" sz="1800" dirty="0" err="1"/>
               <a:t>UberGo</a:t>
             </a:r>
             <a:r>
-              <a:rPr lang="en-US" dirty="0"/>
+              <a:rPr lang="en-US" sz="1800" dirty="0"/>
               <a:t>, rides in a hatchback</a:t>
             </a:r>
           </a:p>
@@ -9931,7 +10493,7 @@
 </p:sld>
 </file>
 
-<file path=ppt/slides/slide5.xml><?xml version="1.0" encoding="utf-8"?>
+<file path=ppt/slides/slide6.xml><?xml version="1.0" encoding="utf-8"?>
 <p:sld xmlns:a="http://schemas.openxmlformats.org/drawingml/2006/main" xmlns:r="http://schemas.openxmlformats.org/officeDocument/2006/relationships" xmlns:p="http://schemas.openxmlformats.org/presentationml/2006/main">
   <p:cSld>
     <p:spTree>
@@ -9983,7 +10545,7 @@
         <p:spPr>
           <a:xfrm>
             <a:off x="818712" y="2222287"/>
-            <a:ext cx="5630214" cy="3636511"/>
+            <a:ext cx="4958633" cy="3636511"/>
           </a:xfrm>
         </p:spPr>
         <p:txBody>
@@ -10039,42 +10601,14 @@
         </p:blipFill>
         <p:spPr>
           <a:xfrm>
-            <a:off x="6929907" y="2311327"/>
-            <a:ext cx="4941605" cy="3933114"/>
+            <a:off x="6267797" y="2222287"/>
+            <a:ext cx="5412523" cy="4307926"/>
           </a:xfrm>
           <a:prstGeom prst="rect">
             <a:avLst/>
           </a:prstGeom>
         </p:spPr>
       </p:pic>
-      <p:sp>
-        <p:nvSpPr>
-          <p:cNvPr id="5" name="TextBox 4"/>
-          <p:cNvSpPr txBox="1"/>
-          <p:nvPr/>
-        </p:nvSpPr>
-        <p:spPr>
-          <a:xfrm>
-            <a:off x="11228911" y="2865515"/>
-            <a:ext cx="642601" cy="3309257"/>
-          </a:xfrm>
-          <a:prstGeom prst="rect">
-            <a:avLst/>
-          </a:prstGeom>
-          <a:solidFill>
-            <a:schemeClr val="tx1"/>
-          </a:solidFill>
-        </p:spPr>
-        <p:txBody>
-          <a:bodyPr wrap="square" rtlCol="0">
-            <a:spAutoFit/>
-          </a:bodyPr>
-          <a:lstStyle/>
-          <a:p>
-            <a:endParaRPr lang="en-US" dirty="0"/>
-          </a:p>
-        </p:txBody>
-      </p:sp>
     </p:spTree>
     <p:extLst>
       <p:ext uri="{BB962C8B-B14F-4D97-AF65-F5344CB8AC3E}">
@@ -10088,7 +10622,7 @@
 </p:sld>
 </file>
 
-<file path=ppt/slides/slide6.xml><?xml version="1.0" encoding="utf-8"?>
+<file path=ppt/slides/slide7.xml><?xml version="1.0" encoding="utf-8"?>
 <p:sld xmlns:a="http://schemas.openxmlformats.org/drawingml/2006/main" xmlns:r="http://schemas.openxmlformats.org/officeDocument/2006/relationships" xmlns:p="http://schemas.openxmlformats.org/presentationml/2006/main">
   <p:cSld>
     <p:spTree>
@@ -10163,14 +10697,24 @@
           <a:p>
             <a:r>
               <a:rPr lang="en-US" dirty="0"/>
-              <a:t>CDL license holders - blood alcohol levels of 0.04 or higher.</a:t>
-            </a:r>
+              <a:t>CDL license holders - blood alcohol levels of 0.04 or </a:t>
+            </a:r>
+            <a:r>
+              <a:rPr lang="en-US" dirty="0" smtClean="0"/>
+              <a:t>higher</a:t>
+            </a:r>
+            <a:endParaRPr lang="en-US" dirty="0"/>
           </a:p>
           <a:p>
             <a:r>
               <a:rPr lang="en-US" dirty="0"/>
-              <a:t>Men are most likely to be involved in this type of crash, with 4 male drunk drivers for every female drunk driver.</a:t>
-            </a:r>
+              <a:t>Men are most likely to be involved in this type of crash, with 4 male drunk drivers for every female drunk </a:t>
+            </a:r>
+            <a:r>
+              <a:rPr lang="en-US" dirty="0" smtClean="0"/>
+              <a:t>driver</a:t>
+            </a:r>
+            <a:endParaRPr lang="en-US" dirty="0"/>
           </a:p>
           <a:p>
             <a:r>
@@ -10234,7 +10778,7 @@
 </p:sld>
 </file>
 
-<file path=ppt/slides/slide7.xml><?xml version="1.0" encoding="utf-8"?>
+<file path=ppt/slides/slide8.xml><?xml version="1.0" encoding="utf-8"?>
 <p:sld xmlns:a="http://schemas.openxmlformats.org/drawingml/2006/main" xmlns:r="http://schemas.openxmlformats.org/officeDocument/2006/relationships" xmlns:p="http://schemas.openxmlformats.org/presentationml/2006/main">
   <p:cSld>
     <p:spTree>
@@ -10297,25 +10841,27 @@
         </p:nvSpPr>
         <p:spPr/>
         <p:txBody>
-          <a:bodyPr/>
+          <a:bodyPr>
+            <a:normAutofit/>
+          </a:bodyPr>
           <a:lstStyle/>
           <a:p>
             <a:r>
-              <a:rPr lang="en-US" dirty="0"/>
+              <a:rPr lang="en-US" sz="2000" dirty="0"/>
               <a:t>Was there an immediate impact on DUI deaths with the introduction of TNCs?</a:t>
             </a:r>
           </a:p>
           <a:p>
             <a:pPr lvl="1"/>
             <a:r>
-              <a:rPr lang="en-US" dirty="0"/>
+              <a:rPr lang="en-US" sz="1800" dirty="0"/>
               <a:t>Which gender has the highest death rates, and which had the highest impact?</a:t>
             </a:r>
           </a:p>
           <a:p>
             <a:pPr lvl="1"/>
             <a:r>
-              <a:rPr lang="en-US" dirty="0"/>
+              <a:rPr lang="en-US" sz="1800" dirty="0"/>
               <a:t>Which age group has the highest death rates, and which had the highest impact?</a:t>
             </a:r>
           </a:p>
@@ -10334,7 +10880,7 @@
 </p:sld>
 </file>
 
-<file path=ppt/slides/slide8.xml><?xml version="1.0" encoding="utf-8"?>
+<file path=ppt/slides/slide9.xml><?xml version="1.0" encoding="utf-8"?>
 <p:sld xmlns:a="http://schemas.openxmlformats.org/drawingml/2006/main" xmlns:r="http://schemas.openxmlformats.org/officeDocument/2006/relationships" xmlns:p="http://schemas.openxmlformats.org/presentationml/2006/main">
   <p:cSld>
     <p:spTree>
@@ -10468,373 +11014,6 @@
     <p:extLst>
       <p:ext uri="{BB962C8B-B14F-4D97-AF65-F5344CB8AC3E}">
         <p14:creationId xmlns:p14="http://schemas.microsoft.com/office/powerpoint/2010/main" val="3034053648"/>
-      </p:ext>
-    </p:extLst>
-  </p:cSld>
-  <p:clrMapOvr>
-    <a:masterClrMapping/>
-  </p:clrMapOvr>
-</p:sld>
-</file>
-
-<file path=ppt/slides/slide9.xml><?xml version="1.0" encoding="utf-8"?>
-<p:sld xmlns:a="http://schemas.openxmlformats.org/drawingml/2006/main" xmlns:r="http://schemas.openxmlformats.org/officeDocument/2006/relationships" xmlns:p="http://schemas.openxmlformats.org/presentationml/2006/main">
-  <p:cSld>
-    <p:bg>
-      <p:bgPr>
-        <a:solidFill>
-          <a:schemeClr val="bg2"/>
-        </a:solidFill>
-        <a:effectLst/>
-      </p:bgPr>
-    </p:bg>
-    <p:spTree>
-      <p:nvGrpSpPr>
-        <p:cNvPr id="1" name=""/>
-        <p:cNvGrpSpPr/>
-        <p:nvPr/>
-      </p:nvGrpSpPr>
-      <p:grpSpPr>
-        <a:xfrm>
-          <a:off x="0" y="0"/>
-          <a:ext cx="0" cy="0"/>
-          <a:chOff x="0" y="0"/>
-          <a:chExt cx="0" cy="0"/>
-        </a:xfrm>
-      </p:grpSpPr>
-      <p:pic>
-        <p:nvPicPr>
-          <p:cNvPr id="4" name="Picture 3">
-            <a:extLst>
-              <a:ext uri="{FF2B5EF4-FFF2-40B4-BE49-F238E27FC236}">
-                <a16:creationId xmlns:a16="http://schemas.microsoft.com/office/drawing/2014/main" id="{189EB6E8-5713-46B3-9518-2323FFBFEDFB}"/>
-              </a:ext>
-            </a:extLst>
-          </p:cNvPr>
-          <p:cNvPicPr>
-            <a:picLocks noChangeAspect="1"/>
-          </p:cNvPicPr>
-          <p:nvPr/>
-        </p:nvPicPr>
-        <p:blipFill rotWithShape="1">
-          <a:blip r:embed="rId2">
-            <a:extLst/>
-          </a:blip>
-          <a:srcRect t="15262" r="9091" b="15401"/>
-          <a:stretch/>
-        </p:blipFill>
-        <p:spPr>
-          <a:xfrm>
-            <a:off x="20" y="-10150"/>
-            <a:ext cx="12191980" cy="6857990"/>
-          </a:xfrm>
-          <a:prstGeom prst="rect">
-            <a:avLst/>
-          </a:prstGeom>
-        </p:spPr>
-      </p:pic>
-      <p:sp>
-        <p:nvSpPr>
-          <p:cNvPr id="14" name="Freeform 9">
-            <a:extLst>
-              <a:ext uri="{FF2B5EF4-FFF2-40B4-BE49-F238E27FC236}">
-                <a16:creationId xmlns:a16="http://schemas.microsoft.com/office/drawing/2014/main" id="{72319FFA-0E4F-4E0B-BEBA-A9DD4B41AAE9}"/>
-              </a:ext>
-              <a:ext uri="{C183D7F6-B498-43B3-948B-1728B52AA6E4}">
-                <adec:decorative xmlns:adec="http://schemas.microsoft.com/office/drawing/2017/decorative" val="1"/>
-              </a:ext>
-            </a:extLst>
-          </p:cNvPr>
-          <p:cNvSpPr>
-            <a:spLocks noGrp="1" noRot="1" noChangeAspect="1" noMove="1" noResize="1" noEditPoints="1" noAdjustHandles="1" noChangeArrowheads="1" noChangeShapeType="1" noTextEdit="1"/>
-          </p:cNvSpPr>
-          <p:nvPr>
-            <p:extLst>
-              <p:ext uri="{386F3935-93C4-4BCD-93E2-E3B085C9AB24}">
-                <p16:designElem xmlns:p16="http://schemas.microsoft.com/office/powerpoint/2015/main" val="1"/>
-              </p:ext>
-            </p:extLst>
-          </p:nvPr>
-        </p:nvSpPr>
-        <p:spPr bwMode="white">
-          <a:xfrm>
-            <a:off x="0" y="0"/>
-            <a:ext cx="6485467" cy="6858000"/>
-          </a:xfrm>
-          <a:custGeom>
-            <a:avLst/>
-            <a:gdLst>
-              <a:gd name="connsiteX0" fmla="*/ 0 w 6485467"/>
-              <a:gd name="connsiteY0" fmla="*/ 0 h 6858000"/>
-              <a:gd name="connsiteX1" fmla="*/ 6485467 w 6485467"/>
-              <a:gd name="connsiteY1" fmla="*/ 0 h 6858000"/>
-              <a:gd name="connsiteX2" fmla="*/ 6485467 w 6485467"/>
-              <a:gd name="connsiteY2" fmla="*/ 1900238 h 6858000"/>
-              <a:gd name="connsiteX3" fmla="*/ 6115051 w 6485467"/>
-              <a:gd name="connsiteY3" fmla="*/ 2178050 h 6858000"/>
-              <a:gd name="connsiteX4" fmla="*/ 6110817 w 6485467"/>
-              <a:gd name="connsiteY4" fmla="*/ 2184400 h 6858000"/>
-              <a:gd name="connsiteX5" fmla="*/ 6104467 w 6485467"/>
-              <a:gd name="connsiteY5" fmla="*/ 2193925 h 6858000"/>
-              <a:gd name="connsiteX6" fmla="*/ 6098117 w 6485467"/>
-              <a:gd name="connsiteY6" fmla="*/ 2201863 h 6858000"/>
-              <a:gd name="connsiteX7" fmla="*/ 6098117 w 6485467"/>
-              <a:gd name="connsiteY7" fmla="*/ 2211388 h 6858000"/>
-              <a:gd name="connsiteX8" fmla="*/ 6098117 w 6485467"/>
-              <a:gd name="connsiteY8" fmla="*/ 2220913 h 6858000"/>
-              <a:gd name="connsiteX9" fmla="*/ 6104467 w 6485467"/>
-              <a:gd name="connsiteY9" fmla="*/ 2228850 h 6858000"/>
-              <a:gd name="connsiteX10" fmla="*/ 6110817 w 6485467"/>
-              <a:gd name="connsiteY10" fmla="*/ 2238375 h 6858000"/>
-              <a:gd name="connsiteX11" fmla="*/ 6115051 w 6485467"/>
-              <a:gd name="connsiteY11" fmla="*/ 2244725 h 6858000"/>
-              <a:gd name="connsiteX12" fmla="*/ 6485467 w 6485467"/>
-              <a:gd name="connsiteY12" fmla="*/ 2522538 h 6858000"/>
-              <a:gd name="connsiteX13" fmla="*/ 6485467 w 6485467"/>
-              <a:gd name="connsiteY13" fmla="*/ 6858000 h 6858000"/>
-              <a:gd name="connsiteX14" fmla="*/ 0 w 6485467"/>
-              <a:gd name="connsiteY14" fmla="*/ 6858000 h 6858000"/>
-            </a:gdLst>
-            <a:ahLst/>
-            <a:cxnLst>
-              <a:cxn ang="0">
-                <a:pos x="connsiteX0" y="connsiteY0"/>
-              </a:cxn>
-              <a:cxn ang="0">
-                <a:pos x="connsiteX1" y="connsiteY1"/>
-              </a:cxn>
-              <a:cxn ang="0">
-                <a:pos x="connsiteX2" y="connsiteY2"/>
-              </a:cxn>
-              <a:cxn ang="0">
-                <a:pos x="connsiteX3" y="connsiteY3"/>
-              </a:cxn>
-              <a:cxn ang="0">
-                <a:pos x="connsiteX4" y="connsiteY4"/>
-              </a:cxn>
-              <a:cxn ang="0">
-                <a:pos x="connsiteX5" y="connsiteY5"/>
-              </a:cxn>
-              <a:cxn ang="0">
-                <a:pos x="connsiteX6" y="connsiteY6"/>
-              </a:cxn>
-              <a:cxn ang="0">
-                <a:pos x="connsiteX7" y="connsiteY7"/>
-              </a:cxn>
-              <a:cxn ang="0">
-                <a:pos x="connsiteX8" y="connsiteY8"/>
-              </a:cxn>
-              <a:cxn ang="0">
-                <a:pos x="connsiteX9" y="connsiteY9"/>
-              </a:cxn>
-              <a:cxn ang="0">
-                <a:pos x="connsiteX10" y="connsiteY10"/>
-              </a:cxn>
-              <a:cxn ang="0">
-                <a:pos x="connsiteX11" y="connsiteY11"/>
-              </a:cxn>
-              <a:cxn ang="0">
-                <a:pos x="connsiteX12" y="connsiteY12"/>
-              </a:cxn>
-              <a:cxn ang="0">
-                <a:pos x="connsiteX13" y="connsiteY13"/>
-              </a:cxn>
-              <a:cxn ang="0">
-                <a:pos x="connsiteX14" y="connsiteY14"/>
-              </a:cxn>
-            </a:cxnLst>
-            <a:rect l="l" t="t" r="r" b="b"/>
-            <a:pathLst>
-              <a:path w="6485467" h="6858000">
-                <a:moveTo>
-                  <a:pt x="0" y="0"/>
-                </a:moveTo>
-                <a:lnTo>
-                  <a:pt x="6485467" y="0"/>
-                </a:lnTo>
-                <a:lnTo>
-                  <a:pt x="6485467" y="1900238"/>
-                </a:lnTo>
-                <a:lnTo>
-                  <a:pt x="6115051" y="2178050"/>
-                </a:lnTo>
-                <a:lnTo>
-                  <a:pt x="6110817" y="2184400"/>
-                </a:lnTo>
-                <a:lnTo>
-                  <a:pt x="6104467" y="2193925"/>
-                </a:lnTo>
-                <a:lnTo>
-                  <a:pt x="6098117" y="2201863"/>
-                </a:lnTo>
-                <a:lnTo>
-                  <a:pt x="6098117" y="2211388"/>
-                </a:lnTo>
-                <a:lnTo>
-                  <a:pt x="6098117" y="2220913"/>
-                </a:lnTo>
-                <a:lnTo>
-                  <a:pt x="6104467" y="2228850"/>
-                </a:lnTo>
-                <a:lnTo>
-                  <a:pt x="6110817" y="2238375"/>
-                </a:lnTo>
-                <a:lnTo>
-                  <a:pt x="6115051" y="2244725"/>
-                </a:lnTo>
-                <a:lnTo>
-                  <a:pt x="6485467" y="2522538"/>
-                </a:lnTo>
-                <a:lnTo>
-                  <a:pt x="6485467" y="6858000"/>
-                </a:lnTo>
-                <a:lnTo>
-                  <a:pt x="0" y="6858000"/>
-                </a:lnTo>
-                <a:close/>
-              </a:path>
-            </a:pathLst>
-          </a:custGeom>
-          <a:solidFill>
-            <a:schemeClr val="bg1">
-              <a:lumMod val="85000"/>
-              <a:lumOff val="15000"/>
-              <a:alpha val="90000"/>
-            </a:schemeClr>
-          </a:solidFill>
-          <a:ln>
-            <a:noFill/>
-          </a:ln>
-          <a:effectLst/>
-        </p:spPr>
-        <p:style>
-          <a:lnRef idx="2">
-            <a:schemeClr val="accent1">
-              <a:shade val="50000"/>
-            </a:schemeClr>
-          </a:lnRef>
-          <a:fillRef idx="1">
-            <a:schemeClr val="accent1"/>
-          </a:fillRef>
-          <a:effectRef idx="0">
-            <a:schemeClr val="accent1"/>
-          </a:effectRef>
-          <a:fontRef idx="minor">
-            <a:schemeClr val="lt1"/>
-          </a:fontRef>
-        </p:style>
-        <p:txBody>
-          <a:bodyPr rtlCol="0" anchor="ctr"/>
-          <a:lstStyle/>
-          <a:p>
-            <a:pPr algn="ctr"/>
-            <a:endParaRPr lang="en-US"/>
-          </a:p>
-        </p:txBody>
-      </p:sp>
-      <p:sp>
-        <p:nvSpPr>
-          <p:cNvPr id="2" name="Title 1"/>
-          <p:cNvSpPr>
-            <a:spLocks noGrp="1"/>
-          </p:cNvSpPr>
-          <p:nvPr>
-            <p:ph type="title"/>
-          </p:nvPr>
-        </p:nvSpPr>
-        <p:spPr>
-          <a:xfrm>
-            <a:off x="810000" y="447188"/>
-            <a:ext cx="4930400" cy="1559412"/>
-          </a:xfrm>
-        </p:spPr>
-        <p:txBody>
-          <a:bodyPr>
-            <a:normAutofit/>
-          </a:bodyPr>
-          <a:lstStyle/>
-          <a:p>
-            <a:r>
-              <a:rPr lang="en-US" dirty="0"/>
-              <a:t>Our Data Process</a:t>
-            </a:r>
-          </a:p>
-        </p:txBody>
-      </p:sp>
-      <p:sp>
-        <p:nvSpPr>
-          <p:cNvPr id="3" name="Content Placeholder 2"/>
-          <p:cNvSpPr>
-            <a:spLocks noGrp="1"/>
-          </p:cNvSpPr>
-          <p:nvPr>
-            <p:ph idx="1"/>
-          </p:nvPr>
-        </p:nvSpPr>
-        <p:spPr>
-          <a:xfrm>
-            <a:off x="818712" y="2413000"/>
-            <a:ext cx="4921687" cy="3632200"/>
-          </a:xfrm>
-        </p:spPr>
-        <p:txBody>
-          <a:bodyPr>
-            <a:normAutofit/>
-          </a:bodyPr>
-          <a:lstStyle/>
-          <a:p>
-            <a:r>
-              <a:rPr lang="en-US" dirty="0"/>
-              <a:t>Export CSVs into </a:t>
-            </a:r>
-            <a:r>
-              <a:rPr lang="en-US" dirty="0" err="1"/>
-              <a:t>Jupyter</a:t>
-            </a:r>
-            <a:r>
-              <a:rPr lang="en-US" dirty="0"/>
-              <a:t> Notebook</a:t>
-            </a:r>
-          </a:p>
-          <a:p>
-            <a:r>
-              <a:rPr lang="en-US" dirty="0"/>
-              <a:t>Begin determining the data we wanted to analyze</a:t>
-            </a:r>
-          </a:p>
-          <a:p>
-            <a:r>
-              <a:rPr lang="en-US" dirty="0"/>
-              <a:t>Cleaned the data</a:t>
-            </a:r>
-          </a:p>
-          <a:p>
-            <a:r>
-              <a:rPr lang="en-US" dirty="0"/>
-              <a:t>Created tables with the relevant data</a:t>
-            </a:r>
-          </a:p>
-          <a:p>
-            <a:r>
-              <a:rPr lang="en-US" dirty="0"/>
-              <a:t>Plotted charts with the data</a:t>
-            </a:r>
-          </a:p>
-          <a:p>
-            <a:r>
-              <a:rPr lang="en-US" dirty="0"/>
-              <a:t>Analyzed the results</a:t>
-            </a:r>
-          </a:p>
-          <a:p>
-            <a:endParaRPr lang="en-US" dirty="0"/>
-          </a:p>
-        </p:txBody>
-      </p:sp>
-    </p:spTree>
-    <p:extLst>
-      <p:ext uri="{BB962C8B-B14F-4D97-AF65-F5344CB8AC3E}">
-        <p14:creationId xmlns:p14="http://schemas.microsoft.com/office/powerpoint/2010/main" val="1793143983"/>
       </p:ext>
     </p:extLst>
   </p:cSld>

</xml_diff>